<commit_message>
Reorg and Resources Oct 30
</commit_message>
<xml_diff>
--- a/Powerpoint/Module00-Intro-GK-Custom.pptx
+++ b/Powerpoint/Module00-Intro-GK-Custom.pptx
@@ -251,7 +251,7 @@
           <a:p>
             <a:fld id="{865CA2D4-094E-48F7-9E06-42143F59D099}" type="datetimeFigureOut">
               <a:rPr lang="en-US" smtClean="0"/>
-              <a:t>10/19/2020</a:t>
+              <a:t>10/29/2020</a:t>
             </a:fld>
             <a:endParaRPr lang="en-US"/>
           </a:p>
@@ -416,7 +416,7 @@
           <a:p>
             <a:fld id="{0D013384-C4FB-4CF7-970C-E0447CD6B19D}" type="datetimeFigureOut">
               <a:rPr lang="en-US" smtClean="0"/>
-              <a:t>10/19/2020</a:t>
+              <a:t>10/29/2020</a:t>
             </a:fld>
             <a:endParaRPr lang="en-US"/>
           </a:p>
@@ -4682,7 +4682,7 @@
           <a:p>
             <a:fld id="{FC69B7DB-8367-4EA5-BD31-DC3A1C807884}" type="datetimeFigureOut">
               <a:rPr lang="en-US" smtClean="0"/>
-              <a:t>10/19/2020</a:t>
+              <a:t>10/29/2020</a:t>
             </a:fld>
             <a:endParaRPr lang="en-US"/>
           </a:p>
@@ -5268,6 +5268,27 @@
               <a:rPr lang="en-US" sz="2000" dirty="0"/>
               <a:t>Profiles and automatic loading</a:t>
             </a:r>
+          </a:p>
+          <a:p>
+            <a:pPr lvl="1"/>
+            <a:r>
+              <a:rPr lang="en-US" sz="2000" dirty="0"/>
+              <a:t>Using UI Elements like </a:t>
+            </a:r>
+            <a:r>
+              <a:rPr lang="en-US" sz="2000" dirty="0" err="1"/>
+              <a:t>Winforms</a:t>
+            </a:r>
+            <a:r>
+              <a:rPr lang="en-US" sz="2000"/>
+              <a:t>/WPF</a:t>
+            </a:r>
+          </a:p>
+          <a:p>
+            <a:pPr marL="457200" lvl="1" indent="0">
+              <a:buNone/>
+            </a:pPr>
+            <a:endParaRPr lang="en-US" sz="2000" dirty="0"/>
           </a:p>
         </p:txBody>
       </p:sp>
@@ -7000,7 +7021,7 @@
             <a:pPr lvl="1"/>
             <a:r>
               <a:rPr lang="en-US" dirty="0"/>
-              <a:t>Around 2:00 pm for 15 minutes</a:t>
+              <a:t>Around 3:00 pm for 15 minutes</a:t>
             </a:r>
           </a:p>
           <a:p>
@@ -7559,7 +7580,15 @@
           <a:p>
             <a:r>
               <a:rPr lang="en-US" sz="2400" dirty="0"/>
-              <a:t>Module 9: Advanced Attributes and Documentation</a:t>
+              <a:t>Module 9: </a:t>
+            </a:r>
+            <a:r>
+              <a:rPr lang="en-US" sz="2400"/>
+              <a:t>Advanced Parameters </a:t>
+            </a:r>
+            <a:r>
+              <a:rPr lang="en-US" sz="2400" dirty="0"/>
+              <a:t>and Documentation</a:t>
             </a:r>
           </a:p>
           <a:p>

</xml_diff>